<commit_message>
Update Presentación 3 de Noviembre de 2020.pptx
</commit_message>
<xml_diff>
--- a/Documentos/Presentación 3 de Noviembre de 2020.pptx
+++ b/Documentos/Presentación 3 de Noviembre de 2020.pptx
@@ -211,7 +211,7 @@
           <a:p>
             <a:fld id="{D42B63A8-CA22-F249-8B11-75777F973014}" type="datetimeFigureOut">
               <a:rPr lang="es-ES_tradnl" smtClean="0"/>
-              <a:t>03/11/2020</a:t>
+              <a:t>06/11/2020</a:t>
             </a:fld>
             <a:endParaRPr lang="es-ES_tradnl"/>
           </a:p>
@@ -1582,7 +1582,7 @@
           <a:p>
             <a:fld id="{6C5AE33D-32CE-4125-A2FD-63556E695E13}" type="datetimeFigureOut">
               <a:rPr lang="es-CO" smtClean="0"/>
-              <a:t>3/11/2020</a:t>
+              <a:t>6/11/2020</a:t>
             </a:fld>
             <a:endParaRPr lang="es-CO"/>
           </a:p>
@@ -7467,8 +7467,8 @@
           <a:chExt cx="0" cy="0"/>
         </a:xfrm>
       </p:grpSpPr>
-      <mc:AlternateContent xmlns:mc="http://schemas.openxmlformats.org/markup-compatibility/2006">
-        <mc:Choice xmlns:a14="http://schemas.microsoft.com/office/drawing/2010/main" Requires="a14">
+      <mc:AlternateContent xmlns:mc="http://schemas.openxmlformats.org/markup-compatibility/2006" xmlns:a14="http://schemas.microsoft.com/office/drawing/2010/main">
+        <mc:Choice Requires="a14">
           <p:sp>
             <p:nvSpPr>
               <p:cNvPr id="2" name="Marcador de contenido 1">
@@ -8400,7 +8400,7 @@
             </p:txBody>
           </p:sp>
         </mc:Choice>
-        <mc:Fallback>
+        <mc:Fallback xmlns="">
           <p:sp>
             <p:nvSpPr>
               <p:cNvPr id="2" name="Marcador de contenido 1">
@@ -11634,8 +11634,8 @@
           <a:chExt cx="0" cy="0"/>
         </a:xfrm>
       </p:grpSpPr>
-      <mc:AlternateContent xmlns:mc="http://schemas.openxmlformats.org/markup-compatibility/2006">
-        <mc:Choice xmlns:a14="http://schemas.microsoft.com/office/drawing/2010/main" Requires="a14">
+      <mc:AlternateContent xmlns:mc="http://schemas.openxmlformats.org/markup-compatibility/2006" xmlns:a14="http://schemas.microsoft.com/office/drawing/2010/main">
+        <mc:Choice Requires="a14">
           <p:sp>
             <p:nvSpPr>
               <p:cNvPr id="2" name="Marcador de contenido 1">
@@ -12907,7 +12907,7 @@
             </p:txBody>
           </p:sp>
         </mc:Choice>
-        <mc:Fallback>
+        <mc:Fallback xmlns="">
           <p:sp>
             <p:nvSpPr>
               <p:cNvPr id="2" name="Marcador de contenido 1">
@@ -15703,7 +15703,7 @@
                           <m:ctrlPr>
                             <a:rPr lang="es-CO" sz="1800" i="1" smtClean="0">
                               <a:solidFill>
-                                <a:srgbClr val="FF0000"/>
+                                <a:schemeClr val="tx1"/>
                               </a:solidFill>
                               <a:effectLst/>
                               <a:latin typeface="Cambria Math" panose="02040503050406030204" pitchFamily="18" charset="0"/>
@@ -15716,7 +15716,7 @@
                           <m:r>
                             <a:rPr lang="en-GB" sz="1800" i="1">
                               <a:solidFill>
-                                <a:srgbClr val="FF0000"/>
+                                <a:schemeClr val="tx1"/>
                               </a:solidFill>
                               <a:effectLst/>
                               <a:latin typeface="Cambria Math" panose="02040503050406030204" pitchFamily="18" charset="0"/>
@@ -15730,7 +15730,7 @@
                           <m:r>
                             <a:rPr lang="en-GB" sz="1800" i="1">
                               <a:solidFill>
-                                <a:srgbClr val="FF0000"/>
+                                <a:schemeClr val="tx1"/>
                               </a:solidFill>
                               <a:effectLst/>
                               <a:latin typeface="Cambria Math" panose="02040503050406030204" pitchFamily="18" charset="0"/>
@@ -15744,7 +15744,7 @@
                       <m:r>
                         <a:rPr lang="en-GB" sz="1800" i="1">
                           <a:solidFill>
-                            <a:srgbClr val="FF0000"/>
+                            <a:schemeClr val="tx1"/>
                           </a:solidFill>
                           <a:effectLst/>
                           <a:latin typeface="Cambria Math" panose="02040503050406030204" pitchFamily="18" charset="0"/>
@@ -15758,7 +15758,7 @@
                           <m:ctrlPr>
                             <a:rPr lang="es-CO" sz="1800" i="1">
                               <a:solidFill>
-                                <a:srgbClr val="FF0000"/>
+                                <a:schemeClr val="tx1"/>
                               </a:solidFill>
                               <a:effectLst/>
                               <a:latin typeface="Cambria Math" panose="02040503050406030204" pitchFamily="18" charset="0"/>
@@ -15771,7 +15771,7 @@
                           <m:r>
                             <a:rPr lang="en-GB" sz="1800" i="1">
                               <a:solidFill>
-                                <a:srgbClr val="FF0000"/>
+                                <a:schemeClr val="tx1"/>
                               </a:solidFill>
                               <a:effectLst/>
                               <a:latin typeface="Cambria Math" panose="02040503050406030204" pitchFamily="18" charset="0"/>
@@ -15785,7 +15785,7 @@
                               <m:ctrlPr>
                                 <a:rPr lang="es-CO" sz="1800" i="1">
                                   <a:solidFill>
-                                    <a:srgbClr val="FF0000"/>
+                                    <a:schemeClr val="tx1"/>
                                   </a:solidFill>
                                   <a:effectLst/>
                                   <a:latin typeface="Cambria Math" panose="02040503050406030204" pitchFamily="18" charset="0"/>
@@ -15798,7 +15798,7 @@
                               <m:r>
                                 <a:rPr lang="en-GB" sz="1800" i="1">
                                   <a:solidFill>
-                                    <a:srgbClr val="FF0000"/>
+                                    <a:schemeClr val="tx1"/>
                                   </a:solidFill>
                                   <a:effectLst/>
                                   <a:latin typeface="Cambria Math" panose="02040503050406030204" pitchFamily="18" charset="0"/>
@@ -15812,7 +15812,7 @@
                               <m:r>
                                 <a:rPr lang="en-GB" sz="1800" i="1">
                                   <a:solidFill>
-                                    <a:srgbClr val="FF0000"/>
+                                    <a:schemeClr val="tx1"/>
                                   </a:solidFill>
                                   <a:effectLst/>
                                   <a:latin typeface="Cambria Math" panose="02040503050406030204" pitchFamily="18" charset="0"/>
@@ -15826,7 +15826,7 @@
                               <m:r>
                                 <a:rPr lang="en-GB" sz="1800" i="1">
                                   <a:solidFill>
-                                    <a:srgbClr val="FF0000"/>
+                                    <a:schemeClr val="tx1"/>
                                   </a:solidFill>
                                   <a:effectLst/>
                                   <a:latin typeface="Cambria Math" panose="02040503050406030204" pitchFamily="18" charset="0"/>
@@ -15840,7 +15840,7 @@
                           <m:r>
                             <a:rPr lang="en-GB" sz="1800" i="1">
                               <a:solidFill>
-                                <a:srgbClr val="FF0000"/>
+                                <a:schemeClr val="tx1"/>
                               </a:solidFill>
                               <a:effectLst/>
                               <a:latin typeface="Cambria Math" panose="02040503050406030204" pitchFamily="18" charset="0"/>
@@ -15852,7 +15852,7 @@
                           <m:r>
                             <a:rPr lang="en-GB" sz="1800" i="1">
                               <a:solidFill>
-                                <a:srgbClr val="FF0000"/>
+                                <a:schemeClr val="tx1"/>
                               </a:solidFill>
                               <a:effectLst/>
                               <a:latin typeface="Cambria Math" panose="02040503050406030204" pitchFamily="18" charset="0"/>
@@ -15866,7 +15866,7 @@
                               <m:ctrlPr>
                                 <a:rPr lang="es-CO" sz="1800" i="1">
                                   <a:solidFill>
-                                    <a:srgbClr val="FF0000"/>
+                                    <a:schemeClr val="tx1"/>
                                   </a:solidFill>
                                   <a:effectLst/>
                                   <a:latin typeface="Cambria Math" panose="02040503050406030204" pitchFamily="18" charset="0"/>
@@ -15879,7 +15879,7 @@
                               <m:r>
                                 <a:rPr lang="en-GB" sz="1800" i="1">
                                   <a:solidFill>
-                                    <a:srgbClr val="FF0000"/>
+                                    <a:schemeClr val="tx1"/>
                                   </a:solidFill>
                                   <a:effectLst/>
                                   <a:latin typeface="Cambria Math" panose="02040503050406030204" pitchFamily="18" charset="0"/>
@@ -15893,7 +15893,7 @@
                               <m:r>
                                 <a:rPr lang="en-GB" sz="1800" i="1">
                                   <a:solidFill>
-                                    <a:srgbClr val="FF0000"/>
+                                    <a:schemeClr val="tx1"/>
                                   </a:solidFill>
                                   <a:effectLst/>
                                   <a:latin typeface="Cambria Math" panose="02040503050406030204" pitchFamily="18" charset="0"/>
@@ -15907,7 +15907,7 @@
                               <m:r>
                                 <a:rPr lang="en-GB" sz="1800" i="1">
                                   <a:solidFill>
-                                    <a:srgbClr val="FF0000"/>
+                                    <a:schemeClr val="tx1"/>
                                   </a:solidFill>
                                   <a:effectLst/>
                                   <a:latin typeface="Cambria Math" panose="02040503050406030204" pitchFamily="18" charset="0"/>
@@ -15923,7 +15923,7 @@
                       <m:r>
                         <a:rPr lang="en-GB" sz="1800" i="1">
                           <a:solidFill>
-                            <a:srgbClr val="FF0000"/>
+                            <a:schemeClr val="tx1"/>
                           </a:solidFill>
                           <a:effectLst/>
                           <a:latin typeface="Cambria Math" panose="02040503050406030204" pitchFamily="18" charset="0"/>
@@ -15935,7 +15935,7 @@
                       <m:r>
                         <a:rPr lang="en-GB" sz="1800" i="1">
                           <a:solidFill>
-                            <a:srgbClr val="FF0000"/>
+                            <a:schemeClr val="tx1"/>
                           </a:solidFill>
                           <a:latin typeface="Cambria Math" panose="02040503050406030204" pitchFamily="18" charset="0"/>
                           <a:ea typeface="Times New Roman" panose="02020603050405020304" pitchFamily="18" charset="0"/>
@@ -15946,7 +15946,7 @@
                       <m:r>
                         <a:rPr lang="es-CO" sz="1800" b="0" i="1" smtClean="0">
                           <a:solidFill>
-                            <a:srgbClr val="FF0000"/>
+                            <a:schemeClr val="tx1"/>
                           </a:solidFill>
                           <a:latin typeface="Cambria Math" panose="02040503050406030204" pitchFamily="18" charset="0"/>
                           <a:ea typeface="Times New Roman" panose="02020603050405020304" pitchFamily="18" charset="0"/>
@@ -15959,7 +15959,7 @@
                           <m:ctrlPr>
                             <a:rPr lang="es-CO" sz="1800" i="1">
                               <a:solidFill>
-                                <a:srgbClr val="FF0000"/>
+                                <a:schemeClr val="tx1"/>
                               </a:solidFill>
                               <a:latin typeface="Cambria Math" panose="02040503050406030204" pitchFamily="18" charset="0"/>
                               <a:ea typeface="Cambria Math" panose="02040503050406030204" pitchFamily="18" charset="0"/>
@@ -15971,7 +15971,7 @@
                           <m:r>
                             <a:rPr lang="es-CO" sz="1800" i="1">
                               <a:solidFill>
-                                <a:srgbClr val="FF0000"/>
+                                <a:schemeClr val="tx1"/>
                               </a:solidFill>
                               <a:latin typeface="Cambria Math" panose="02040503050406030204" pitchFamily="18" charset="0"/>
                               <a:ea typeface="Cambria Math" panose="02040503050406030204" pitchFamily="18" charset="0"/>
@@ -15984,7 +15984,7 @@
                           <m:r>
                             <a:rPr lang="es-CO" sz="1800" i="1">
                               <a:solidFill>
-                                <a:srgbClr val="FF0000"/>
+                                <a:schemeClr val="tx1"/>
                               </a:solidFill>
                               <a:latin typeface="Cambria Math" panose="02040503050406030204" pitchFamily="18" charset="0"/>
                               <a:ea typeface="Cambria Math" panose="02040503050406030204" pitchFamily="18" charset="0"/>
@@ -15997,7 +15997,7 @@
                           <m:r>
                             <a:rPr lang="es-CO" sz="1800" i="1">
                               <a:solidFill>
-                                <a:srgbClr val="FF0000"/>
+                                <a:schemeClr val="tx1"/>
                               </a:solidFill>
                               <a:latin typeface="Cambria Math" panose="02040503050406030204" pitchFamily="18" charset="0"/>
                               <a:ea typeface="Cambria Math" panose="02040503050406030204" pitchFamily="18" charset="0"/>
@@ -16010,7 +16010,7 @@
                       <m:r>
                         <a:rPr lang="en-GB" sz="1800" i="1">
                           <a:solidFill>
-                            <a:srgbClr val="FF0000"/>
+                            <a:schemeClr val="tx1"/>
                           </a:solidFill>
                           <a:latin typeface="Cambria Math" panose="02040503050406030204" pitchFamily="18" charset="0"/>
                           <a:ea typeface="Times New Roman" panose="02020603050405020304" pitchFamily="18" charset="0"/>
@@ -16023,7 +16023,7 @@
                           <m:ctrlPr>
                             <a:rPr lang="es-CO" sz="1800" i="1">
                               <a:solidFill>
-                                <a:srgbClr val="FF0000"/>
+                                <a:schemeClr val="tx1"/>
                               </a:solidFill>
                               <a:effectLst/>
                               <a:latin typeface="Cambria Math" panose="02040503050406030204" pitchFamily="18" charset="0"/>
@@ -16036,7 +16036,7 @@
                           <m:r>
                             <a:rPr lang="en-GB" sz="1800" i="1">
                               <a:solidFill>
-                                <a:srgbClr val="FF0000"/>
+                                <a:schemeClr val="tx1"/>
                               </a:solidFill>
                               <a:effectLst/>
                               <a:latin typeface="Cambria Math" panose="02040503050406030204" pitchFamily="18" charset="0"/>
@@ -16050,7 +16050,7 @@
                           <m:r>
                             <a:rPr lang="en-GB" sz="1800" i="1">
                               <a:solidFill>
-                                <a:srgbClr val="FF0000"/>
+                                <a:schemeClr val="tx1"/>
                               </a:solidFill>
                               <a:effectLst/>
                               <a:latin typeface="Cambria Math" panose="02040503050406030204" pitchFamily="18" charset="0"/>
@@ -16064,7 +16064,7 @@
                       <m:r>
                         <a:rPr lang="en-GB" sz="1800" i="1">
                           <a:solidFill>
-                            <a:srgbClr val="FF0000"/>
+                            <a:schemeClr val="tx1"/>
                           </a:solidFill>
                           <a:effectLst/>
                           <a:latin typeface="Cambria Math" panose="02040503050406030204" pitchFamily="18" charset="0"/>
@@ -16078,7 +16078,7 @@
                           <m:ctrlPr>
                             <a:rPr lang="es-CO" sz="1800" i="1">
                               <a:solidFill>
-                                <a:srgbClr val="FF0000"/>
+                                <a:schemeClr val="tx1"/>
                               </a:solidFill>
                               <a:effectLst/>
                               <a:latin typeface="Cambria Math" panose="02040503050406030204" pitchFamily="18" charset="0"/>
@@ -16094,7 +16094,7 @@
                               <m:ctrlPr>
                                 <a:rPr lang="es-CO" sz="1800" i="1">
                                   <a:solidFill>
-                                    <a:srgbClr val="FF0000"/>
+                                    <a:schemeClr val="tx1"/>
                                   </a:solidFill>
                                   <a:effectLst/>
                                   <a:latin typeface="Cambria Math" panose="02040503050406030204" pitchFamily="18" charset="0"/>
@@ -16107,7 +16107,7 @@
                               <m:r>
                                 <a:rPr lang="es-CO" sz="1800" i="1">
                                   <a:solidFill>
-                                    <a:srgbClr val="FF0000"/>
+                                    <a:schemeClr val="tx1"/>
                                   </a:solidFill>
                                   <a:effectLst/>
                                   <a:latin typeface="Cambria Math" panose="02040503050406030204" pitchFamily="18" charset="0"/>
@@ -16123,7 +16123,7 @@
                           <m:r>
                             <a:rPr lang="es-CO" sz="1800" i="1">
                               <a:solidFill>
-                                <a:srgbClr val="FF0000"/>
+                                <a:schemeClr val="tx1"/>
                               </a:solidFill>
                               <a:effectLst/>
                               <a:latin typeface="Cambria Math" panose="02040503050406030204" pitchFamily="18" charset="0"/>
@@ -16137,7 +16137,7 @@
                           <m:r>
                             <a:rPr lang="es-CO" sz="1800" i="1">
                               <a:solidFill>
-                                <a:srgbClr val="FF0000"/>
+                                <a:schemeClr val="tx1"/>
                               </a:solidFill>
                               <a:effectLst/>
                               <a:latin typeface="Cambria Math" panose="02040503050406030204" pitchFamily="18" charset="0"/>
@@ -16153,7 +16153,7 @@
                 </a14:m>
                 <a:endParaRPr lang="en-GB" sz="2000" dirty="0">
                   <a:solidFill>
-                    <a:srgbClr val="FF0000"/>
+                    <a:schemeClr val="tx1"/>
                   </a:solidFill>
                   <a:latin typeface="Century Gothic" panose="020B0502020202020204" pitchFamily="34" charset="0"/>
                   <a:ea typeface="Calibri" panose="020F0502020204030204" pitchFamily="34" charset="0"/>
@@ -16163,494 +16163,16 @@
               <a:p>
                 <a:pPr algn="just"/>
                 <a:r>
-                  <a:rPr lang="en-GB" sz="2000" dirty="0">
+                  <a:rPr lang="es-CO" sz="1800" dirty="0">
                     <a:latin typeface="Century Gothic" panose="020B0502020202020204" pitchFamily="34" charset="0"/>
                     <a:ea typeface="Calibri" panose="020F0502020204030204" pitchFamily="34" charset="0"/>
                     <a:cs typeface="Times New Roman" panose="02020603050405020304" pitchFamily="18" charset="0"/>
                   </a:rPr>
-                  <a:t>Total financial needs of the firms. </a:t>
+                  <a:t>How the firms are affected?</a:t>
                 </a:r>
-              </a:p>
-              <a:p>
-                <a:pPr marL="0" indent="0">
-                  <a:buNone/>
-                </a:pPr>
-                <a14:m>
-                  <m:oMathPara xmlns:m="http://schemas.openxmlformats.org/officeDocument/2006/math">
-                    <m:oMathParaPr>
-                      <m:jc m:val="centerGroup"/>
-                    </m:oMathParaPr>
-                    <m:oMath xmlns:m="http://schemas.openxmlformats.org/officeDocument/2006/math">
-                      <m:r>
-                        <a:rPr lang="en-GB" sz="1800" i="1" smtClean="0">
-                          <a:solidFill>
-                            <a:srgbClr val="FF0000"/>
-                          </a:solidFill>
-                          <a:effectLst/>
-                          <a:latin typeface="Cambria Math" panose="02040503050406030204" pitchFamily="18" charset="0"/>
-                          <a:ea typeface="Times New Roman" panose="02020603050405020304" pitchFamily="18" charset="0"/>
-                          <a:cs typeface="Times New Roman" panose="02020603050405020304" pitchFamily="18" charset="0"/>
-                        </a:rPr>
-                        <m:t>𝑇𝐹</m:t>
-                      </m:r>
-                      <m:sSub>
-                        <m:sSubPr>
-                          <m:ctrlPr>
-                            <a:rPr lang="es-CO" sz="1800" i="1">
-                              <a:solidFill>
-                                <a:srgbClr val="FF0000"/>
-                              </a:solidFill>
-                              <a:effectLst/>
-                              <a:latin typeface="Cambria Math" panose="02040503050406030204" pitchFamily="18" charset="0"/>
-                              <a:ea typeface="Times New Roman" panose="02020603050405020304" pitchFamily="18" charset="0"/>
-                              <a:cs typeface="Times New Roman" panose="02020603050405020304" pitchFamily="18" charset="0"/>
-                            </a:rPr>
-                          </m:ctrlPr>
-                        </m:sSubPr>
-                        <m:e>
-                          <m:r>
-                            <a:rPr lang="en-GB" sz="1800" i="1">
-                              <a:solidFill>
-                                <a:srgbClr val="FF0000"/>
-                              </a:solidFill>
-                              <a:effectLst/>
-                              <a:latin typeface="Cambria Math" panose="02040503050406030204" pitchFamily="18" charset="0"/>
-                              <a:ea typeface="Times New Roman" panose="02020603050405020304" pitchFamily="18" charset="0"/>
-                              <a:cs typeface="Times New Roman" panose="02020603050405020304" pitchFamily="18" charset="0"/>
-                            </a:rPr>
-                            <m:t>𝑁</m:t>
-                          </m:r>
-                        </m:e>
-                        <m:sub>
-                          <m:r>
-                            <a:rPr lang="en-GB" sz="1800" i="1">
-                              <a:solidFill>
-                                <a:srgbClr val="FF0000"/>
-                              </a:solidFill>
-                              <a:effectLst/>
-                              <a:latin typeface="Cambria Math" panose="02040503050406030204" pitchFamily="18" charset="0"/>
-                              <a:ea typeface="Times New Roman" panose="02020603050405020304" pitchFamily="18" charset="0"/>
-                              <a:cs typeface="Times New Roman" panose="02020603050405020304" pitchFamily="18" charset="0"/>
-                            </a:rPr>
-                            <m:t>𝐹</m:t>
-                          </m:r>
-                        </m:sub>
-                      </m:sSub>
-                      <m:r>
-                        <a:rPr lang="en-GB" sz="1800" i="1">
-                          <a:solidFill>
-                            <a:srgbClr val="FF0000"/>
-                          </a:solidFill>
-                          <a:effectLst/>
-                          <a:latin typeface="Cambria Math" panose="02040503050406030204" pitchFamily="18" charset="0"/>
-                          <a:ea typeface="Times New Roman" panose="02020603050405020304" pitchFamily="18" charset="0"/>
-                          <a:cs typeface="Times New Roman" panose="02020603050405020304" pitchFamily="18" charset="0"/>
-                        </a:rPr>
-                        <m:t>=</m:t>
-                      </m:r>
-                      <m:r>
-                        <a:rPr lang="en-GB" sz="1800" i="1">
-                          <a:solidFill>
-                            <a:srgbClr val="FF0000"/>
-                          </a:solidFill>
-                          <a:latin typeface="Cambria Math" panose="02040503050406030204" pitchFamily="18" charset="0"/>
-                          <a:ea typeface="Times New Roman" panose="02020603050405020304" pitchFamily="18" charset="0"/>
-                          <a:cs typeface="Times New Roman" panose="02020603050405020304" pitchFamily="18" charset="0"/>
-                        </a:rPr>
-                        <m:t>(</m:t>
-                      </m:r>
-                      <m:r>
-                        <a:rPr lang="es-CO" sz="1800" i="1">
-                          <a:solidFill>
-                            <a:srgbClr val="FF0000"/>
-                          </a:solidFill>
-                          <a:latin typeface="Cambria Math" panose="02040503050406030204" pitchFamily="18" charset="0"/>
-                          <a:ea typeface="Times New Roman" panose="02020603050405020304" pitchFamily="18" charset="0"/>
-                          <a:cs typeface="Times New Roman" panose="02020603050405020304" pitchFamily="18" charset="0"/>
-                        </a:rPr>
-                        <m:t>1+</m:t>
-                      </m:r>
-                      <m:sSubSup>
-                        <m:sSubSupPr>
-                          <m:ctrlPr>
-                            <a:rPr lang="es-CO" sz="1800" i="1">
-                              <a:solidFill>
-                                <a:srgbClr val="FF0000"/>
-                              </a:solidFill>
-                              <a:latin typeface="Cambria Math" panose="02040503050406030204" pitchFamily="18" charset="0"/>
-                              <a:ea typeface="Cambria Math" panose="02040503050406030204" pitchFamily="18" charset="0"/>
-                              <a:cs typeface="Times New Roman" panose="02020603050405020304" pitchFamily="18" charset="0"/>
-                            </a:rPr>
-                          </m:ctrlPr>
-                        </m:sSubSupPr>
-                        <m:e>
-                          <m:r>
-                            <a:rPr lang="es-CO" sz="1800" i="1">
-                              <a:solidFill>
-                                <a:srgbClr val="FF0000"/>
-                              </a:solidFill>
-                              <a:latin typeface="Cambria Math" panose="02040503050406030204" pitchFamily="18" charset="0"/>
-                              <a:ea typeface="Cambria Math" panose="02040503050406030204" pitchFamily="18" charset="0"/>
-                              <a:cs typeface="Times New Roman" panose="02020603050405020304" pitchFamily="18" charset="0"/>
-                            </a:rPr>
-                            <m:t>𝜏</m:t>
-                          </m:r>
-                        </m:e>
-                        <m:sub>
-                          <m:r>
-                            <a:rPr lang="es-CO" sz="1800" b="0" i="1" smtClean="0">
-                              <a:solidFill>
-                                <a:srgbClr val="FF0000"/>
-                              </a:solidFill>
-                              <a:latin typeface="Cambria Math" panose="02040503050406030204" pitchFamily="18" charset="0"/>
-                              <a:ea typeface="Cambria Math" panose="02040503050406030204" pitchFamily="18" charset="0"/>
-                              <a:cs typeface="Times New Roman" panose="02020603050405020304" pitchFamily="18" charset="0"/>
-                            </a:rPr>
-                            <m:t>𝐼</m:t>
-                          </m:r>
-                        </m:sub>
-                        <m:sup>
-                          <m:r>
-                            <a:rPr lang="es-CO" sz="1800" i="1">
-                              <a:solidFill>
-                                <a:srgbClr val="FF0000"/>
-                              </a:solidFill>
-                              <a:latin typeface="Cambria Math" panose="02040503050406030204" pitchFamily="18" charset="0"/>
-                              <a:ea typeface="Cambria Math" panose="02040503050406030204" pitchFamily="18" charset="0"/>
-                              <a:cs typeface="Times New Roman" panose="02020603050405020304" pitchFamily="18" charset="0"/>
-                            </a:rPr>
-                            <m:t>𝐴</m:t>
-                          </m:r>
-                        </m:sup>
-                      </m:sSubSup>
-                      <m:r>
-                        <a:rPr lang="en-GB" sz="1800" i="1">
-                          <a:solidFill>
-                            <a:srgbClr val="FF0000"/>
-                          </a:solidFill>
-                          <a:latin typeface="Cambria Math" panose="02040503050406030204" pitchFamily="18" charset="0"/>
-                          <a:ea typeface="Times New Roman" panose="02020603050405020304" pitchFamily="18" charset="0"/>
-                          <a:cs typeface="Times New Roman" panose="02020603050405020304" pitchFamily="18" charset="0"/>
-                        </a:rPr>
-                        <m:t>)</m:t>
-                      </m:r>
-                      <m:r>
-                        <a:rPr lang="en-GB" sz="1800" i="1">
-                          <a:solidFill>
-                            <a:srgbClr val="FF0000"/>
-                          </a:solidFill>
-                          <a:effectLst/>
-                          <a:latin typeface="Cambria Math" panose="02040503050406030204" pitchFamily="18" charset="0"/>
-                          <a:ea typeface="Times New Roman" panose="02020603050405020304" pitchFamily="18" charset="0"/>
-                          <a:cs typeface="Times New Roman" panose="02020603050405020304" pitchFamily="18" charset="0"/>
-                        </a:rPr>
-                        <m:t>𝑝</m:t>
-                      </m:r>
-                      <m:r>
-                        <a:rPr lang="en-GB" sz="1800" i="1">
-                          <a:solidFill>
-                            <a:srgbClr val="FF0000"/>
-                          </a:solidFill>
-                          <a:effectLst/>
-                          <a:latin typeface="Cambria Math" panose="02040503050406030204" pitchFamily="18" charset="0"/>
-                          <a:ea typeface="Calibri" panose="020F0502020204030204" pitchFamily="34" charset="0"/>
-                          <a:cs typeface="Times New Roman" panose="02020603050405020304" pitchFamily="18" charset="0"/>
-                        </a:rPr>
-                        <m:t>⋅</m:t>
-                      </m:r>
-                      <m:sSup>
-                        <m:sSupPr>
-                          <m:ctrlPr>
-                            <a:rPr lang="es-CO" sz="1800" i="1">
-                              <a:solidFill>
-                                <a:srgbClr val="FF0000"/>
-                              </a:solidFill>
-                              <a:effectLst/>
-                              <a:latin typeface="Cambria Math" panose="02040503050406030204" pitchFamily="18" charset="0"/>
-                              <a:ea typeface="Calibri" panose="020F0502020204030204" pitchFamily="34" charset="0"/>
-                              <a:cs typeface="Times New Roman" panose="02020603050405020304" pitchFamily="18" charset="0"/>
-                            </a:rPr>
-                          </m:ctrlPr>
-                        </m:sSupPr>
-                        <m:e>
-                          <m:r>
-                            <a:rPr lang="en-GB" sz="1800" i="1">
-                              <a:solidFill>
-                                <a:srgbClr val="FF0000"/>
-                              </a:solidFill>
-                              <a:effectLst/>
-                              <a:latin typeface="Cambria Math" panose="02040503050406030204" pitchFamily="18" charset="0"/>
-                              <a:ea typeface="Calibri" panose="020F0502020204030204" pitchFamily="34" charset="0"/>
-                              <a:cs typeface="Times New Roman" panose="02020603050405020304" pitchFamily="18" charset="0"/>
-                            </a:rPr>
-                            <m:t>𝐼</m:t>
-                          </m:r>
-                        </m:e>
-                        <m:sup>
-                          <m:r>
-                            <a:rPr lang="en-GB" sz="1800" i="1">
-                              <a:solidFill>
-                                <a:srgbClr val="FF0000"/>
-                              </a:solidFill>
-                              <a:effectLst/>
-                              <a:latin typeface="Cambria Math" panose="02040503050406030204" pitchFamily="18" charset="0"/>
-                              <a:ea typeface="Calibri" panose="020F0502020204030204" pitchFamily="34" charset="0"/>
-                              <a:cs typeface="Times New Roman" panose="02020603050405020304" pitchFamily="18" charset="0"/>
-                            </a:rPr>
-                            <m:t>𝐾</m:t>
-                          </m:r>
-                        </m:sup>
-                      </m:sSup>
-                      <m:r>
-                        <a:rPr lang="en-GB" sz="1800" i="1">
-                          <a:solidFill>
-                            <a:srgbClr val="FF0000"/>
-                          </a:solidFill>
-                          <a:effectLst/>
-                          <a:latin typeface="Cambria Math" panose="02040503050406030204" pitchFamily="18" charset="0"/>
-                          <a:ea typeface="Calibri" panose="020F0502020204030204" pitchFamily="34" charset="0"/>
-                          <a:cs typeface="Times New Roman" panose="02020603050405020304" pitchFamily="18" charset="0"/>
-                        </a:rPr>
-                        <m:t>−</m:t>
-                      </m:r>
-                      <m:r>
-                        <a:rPr lang="en-GB" sz="1800" i="1">
-                          <a:solidFill>
-                            <a:srgbClr val="FF0000"/>
-                          </a:solidFill>
-                          <a:effectLst/>
-                          <a:latin typeface="Cambria Math" panose="02040503050406030204" pitchFamily="18" charset="0"/>
-                          <a:ea typeface="Calibri" panose="020F0502020204030204" pitchFamily="34" charset="0"/>
-                          <a:cs typeface="Times New Roman" panose="02020603050405020304" pitchFamily="18" charset="0"/>
-                        </a:rPr>
-                        <m:t>𝑅</m:t>
-                      </m:r>
-                      <m:sSub>
-                        <m:sSubPr>
-                          <m:ctrlPr>
-                            <a:rPr lang="es-CO" sz="1800" i="1">
-                              <a:solidFill>
-                                <a:srgbClr val="FF0000"/>
-                              </a:solidFill>
-                              <a:effectLst/>
-                              <a:latin typeface="Cambria Math" panose="02040503050406030204" pitchFamily="18" charset="0"/>
-                              <a:ea typeface="Calibri" panose="020F0502020204030204" pitchFamily="34" charset="0"/>
-                              <a:cs typeface="Times New Roman" panose="02020603050405020304" pitchFamily="18" charset="0"/>
-                            </a:rPr>
-                          </m:ctrlPr>
-                        </m:sSubPr>
-                        <m:e>
-                          <m:r>
-                            <a:rPr lang="en-GB" sz="1800" i="1">
-                              <a:solidFill>
-                                <a:srgbClr val="FF0000"/>
-                              </a:solidFill>
-                              <a:effectLst/>
-                              <a:latin typeface="Cambria Math" panose="02040503050406030204" pitchFamily="18" charset="0"/>
-                              <a:ea typeface="Calibri" panose="020F0502020204030204" pitchFamily="34" charset="0"/>
-                              <a:cs typeface="Times New Roman" panose="02020603050405020304" pitchFamily="18" charset="0"/>
-                            </a:rPr>
-                            <m:t>𝐸</m:t>
-                          </m:r>
-                        </m:e>
-                        <m:sub>
-                          <m:r>
-                            <a:rPr lang="en-GB" sz="1800" i="1">
-                              <a:solidFill>
-                                <a:srgbClr val="FF0000"/>
-                              </a:solidFill>
-                              <a:effectLst/>
-                              <a:latin typeface="Cambria Math" panose="02040503050406030204" pitchFamily="18" charset="0"/>
-                              <a:ea typeface="Calibri" panose="020F0502020204030204" pitchFamily="34" charset="0"/>
-                              <a:cs typeface="Times New Roman" panose="02020603050405020304" pitchFamily="18" charset="0"/>
-                            </a:rPr>
-                            <m:t>𝐹</m:t>
-                          </m:r>
-                        </m:sub>
-                      </m:sSub>
-                      <m:r>
-                        <a:rPr lang="en-GB" sz="1800" i="1">
-                          <a:solidFill>
-                            <a:srgbClr val="FF0000"/>
-                          </a:solidFill>
-                          <a:effectLst/>
-                          <a:latin typeface="Cambria Math" panose="02040503050406030204" pitchFamily="18" charset="0"/>
-                          <a:ea typeface="Calibri" panose="020F0502020204030204" pitchFamily="34" charset="0"/>
-                          <a:cs typeface="Times New Roman" panose="02020603050405020304" pitchFamily="18" charset="0"/>
-                        </a:rPr>
-                        <m:t>− </m:t>
-                      </m:r>
-                      <m:sSub>
-                        <m:sSubPr>
-                          <m:ctrlPr>
-                            <a:rPr lang="es-CO" sz="1800" i="1">
-                              <a:solidFill>
-                                <a:srgbClr val="FF0000"/>
-                              </a:solidFill>
-                              <a:effectLst/>
-                              <a:latin typeface="Cambria Math" panose="02040503050406030204" pitchFamily="18" charset="0"/>
-                              <a:ea typeface="Calibri" panose="020F0502020204030204" pitchFamily="34" charset="0"/>
-                              <a:cs typeface="Times New Roman" panose="02020603050405020304" pitchFamily="18" charset="0"/>
-                            </a:rPr>
-                          </m:ctrlPr>
-                        </m:sSubPr>
-                        <m:e>
-                          <m:r>
-                            <a:rPr lang="en-GB" sz="1800" i="1">
-                              <a:solidFill>
-                                <a:srgbClr val="FF0000"/>
-                              </a:solidFill>
-                              <a:effectLst/>
-                              <a:latin typeface="Cambria Math" panose="02040503050406030204" pitchFamily="18" charset="0"/>
-                              <a:ea typeface="Calibri" panose="020F0502020204030204" pitchFamily="34" charset="0"/>
-                              <a:cs typeface="Times New Roman" panose="02020603050405020304" pitchFamily="18" charset="0"/>
-                            </a:rPr>
-                            <m:t>𝜉</m:t>
-                          </m:r>
-                        </m:e>
-                        <m:sub>
-                          <m:r>
-                            <a:rPr lang="en-GB" sz="1800" i="1">
-                              <a:solidFill>
-                                <a:srgbClr val="FF0000"/>
-                              </a:solidFill>
-                              <a:effectLst/>
-                              <a:latin typeface="Cambria Math" panose="02040503050406030204" pitchFamily="18" charset="0"/>
-                              <a:ea typeface="Calibri" panose="020F0502020204030204" pitchFamily="34" charset="0"/>
-                              <a:cs typeface="Times New Roman" panose="02020603050405020304" pitchFamily="18" charset="0"/>
-                            </a:rPr>
-                            <m:t>𝐹</m:t>
-                          </m:r>
-                        </m:sub>
-                      </m:sSub>
-                      <m:r>
-                        <a:rPr lang="en-GB" sz="1800" i="1">
-                          <a:solidFill>
-                            <a:srgbClr val="FF0000"/>
-                          </a:solidFill>
-                          <a:effectLst/>
-                          <a:latin typeface="Cambria Math" panose="02040503050406030204" pitchFamily="18" charset="0"/>
-                          <a:ea typeface="Calibri" panose="020F0502020204030204" pitchFamily="34" charset="0"/>
-                          <a:cs typeface="Times New Roman" panose="02020603050405020304" pitchFamily="18" charset="0"/>
-                        </a:rPr>
-                        <m:t>⋅</m:t>
-                      </m:r>
-                      <m:r>
-                        <a:rPr lang="en-GB" sz="1800" i="1">
-                          <a:solidFill>
-                            <a:srgbClr val="FF0000"/>
-                          </a:solidFill>
-                          <a:effectLst/>
-                          <a:latin typeface="Cambria Math" panose="02040503050406030204" pitchFamily="18" charset="0"/>
-                          <a:ea typeface="Calibri" panose="020F0502020204030204" pitchFamily="34" charset="0"/>
-                          <a:cs typeface="Times New Roman" panose="02020603050405020304" pitchFamily="18" charset="0"/>
-                        </a:rPr>
-                        <m:t>𝐹𝐷</m:t>
-                      </m:r>
-                      <m:sSup>
-                        <m:sSupPr>
-                          <m:ctrlPr>
-                            <a:rPr lang="es-CO" sz="1800" i="1">
-                              <a:solidFill>
-                                <a:srgbClr val="FF0000"/>
-                              </a:solidFill>
-                              <a:effectLst/>
-                              <a:latin typeface="Cambria Math" panose="02040503050406030204" pitchFamily="18" charset="0"/>
-                              <a:ea typeface="Calibri" panose="020F0502020204030204" pitchFamily="34" charset="0"/>
-                              <a:cs typeface="Times New Roman" panose="02020603050405020304" pitchFamily="18" charset="0"/>
-                            </a:rPr>
-                          </m:ctrlPr>
-                        </m:sSupPr>
-                        <m:e>
-                          <m:r>
-                            <a:rPr lang="en-GB" sz="1800" i="1">
-                              <a:solidFill>
-                                <a:srgbClr val="FF0000"/>
-                              </a:solidFill>
-                              <a:effectLst/>
-                              <a:latin typeface="Cambria Math" panose="02040503050406030204" pitchFamily="18" charset="0"/>
-                              <a:ea typeface="Calibri" panose="020F0502020204030204" pitchFamily="34" charset="0"/>
-                              <a:cs typeface="Times New Roman" panose="02020603050405020304" pitchFamily="18" charset="0"/>
-                            </a:rPr>
-                            <m:t>𝐼</m:t>
-                          </m:r>
-                        </m:e>
-                        <m:sup>
-                          <m:r>
-                            <a:rPr lang="en-GB" sz="1800" i="1">
-                              <a:solidFill>
-                                <a:srgbClr val="FF0000"/>
-                              </a:solidFill>
-                              <a:effectLst/>
-                              <a:latin typeface="Cambria Math" panose="02040503050406030204" pitchFamily="18" charset="0"/>
-                              <a:ea typeface="Calibri" panose="020F0502020204030204" pitchFamily="34" charset="0"/>
-                              <a:cs typeface="Times New Roman" panose="02020603050405020304" pitchFamily="18" charset="0"/>
-                            </a:rPr>
-                            <m:t>𝑃</m:t>
-                          </m:r>
-                        </m:sup>
-                      </m:sSup>
-                      <m:r>
-                        <a:rPr lang="en-GB" sz="1800" i="1">
-                          <a:solidFill>
-                            <a:srgbClr val="FF0000"/>
-                          </a:solidFill>
-                          <a:effectLst/>
-                          <a:latin typeface="Cambria Math" panose="02040503050406030204" pitchFamily="18" charset="0"/>
-                          <a:ea typeface="Calibri" panose="020F0502020204030204" pitchFamily="34" charset="0"/>
-                          <a:cs typeface="Times New Roman" panose="02020603050405020304" pitchFamily="18" charset="0"/>
-                        </a:rPr>
-                        <m:t>⋅</m:t>
-                      </m:r>
-                      <m:sSup>
-                        <m:sSupPr>
-                          <m:ctrlPr>
-                            <a:rPr lang="es-CO" sz="1800" i="1">
-                              <a:solidFill>
-                                <a:srgbClr val="FF0000"/>
-                              </a:solidFill>
-                              <a:effectLst/>
-                              <a:latin typeface="Cambria Math" panose="02040503050406030204" pitchFamily="18" charset="0"/>
-                              <a:ea typeface="Calibri" panose="020F0502020204030204" pitchFamily="34" charset="0"/>
-                              <a:cs typeface="Times New Roman" panose="02020603050405020304" pitchFamily="18" charset="0"/>
-                            </a:rPr>
-                          </m:ctrlPr>
-                        </m:sSupPr>
-                        <m:e>
-                          <m:r>
-                            <a:rPr lang="en-GB" sz="1800" i="1">
-                              <a:solidFill>
-                                <a:srgbClr val="FF0000"/>
-                              </a:solidFill>
-                              <a:effectLst/>
-                              <a:latin typeface="Cambria Math" panose="02040503050406030204" pitchFamily="18" charset="0"/>
-                              <a:ea typeface="Calibri" panose="020F0502020204030204" pitchFamily="34" charset="0"/>
-                              <a:cs typeface="Times New Roman" panose="02020603050405020304" pitchFamily="18" charset="0"/>
-                            </a:rPr>
-                            <m:t>𝑒</m:t>
-                          </m:r>
-                        </m:e>
-                        <m:sup>
-                          <m:r>
-                            <a:rPr lang="en-GB" sz="1800" i="1">
-                              <a:solidFill>
-                                <a:srgbClr val="FF0000"/>
-                              </a:solidFill>
-                              <a:effectLst/>
-                              <a:latin typeface="Cambria Math" panose="02040503050406030204" pitchFamily="18" charset="0"/>
-                              <a:ea typeface="Calibri" panose="020F0502020204030204" pitchFamily="34" charset="0"/>
-                              <a:cs typeface="Times New Roman" panose="02020603050405020304" pitchFamily="18" charset="0"/>
-                            </a:rPr>
-                            <m:t>𝑁</m:t>
-                          </m:r>
-                        </m:sup>
-                      </m:sSup>
-                    </m:oMath>
-                  </m:oMathPara>
-                </a14:m>
                 <a:endParaRPr lang="es-CO" sz="1800" dirty="0">
                   <a:effectLst/>
-                  <a:latin typeface="Calibri" panose="020F0502020204030204" pitchFamily="34" charset="0"/>
+                  <a:latin typeface="Century Gothic" panose="020B0502020202020204" pitchFamily="34" charset="0"/>
                   <a:ea typeface="Calibri" panose="020F0502020204030204" pitchFamily="34" charset="0"/>
                   <a:cs typeface="Times New Roman" panose="02020603050405020304" pitchFamily="18" charset="0"/>
                 </a:endParaRPr>

</xml_diff>

<commit_message>
Ecuaciones Modificación en R
</commit_message>
<xml_diff>
--- a/Documentos/Presentación 3 de Noviembre de 2020.pptx
+++ b/Documentos/Presentación 3 de Noviembre de 2020.pptx
@@ -214,7 +214,7 @@
           <a:p>
             <a:fld id="{D42B63A8-CA22-F249-8B11-75777F973014}" type="datetimeFigureOut">
               <a:rPr lang="es-ES_tradnl" smtClean="0"/>
-              <a:t>6/11/20</a:t>
+              <a:t>06/11/2020</a:t>
             </a:fld>
             <a:endParaRPr lang="es-ES_tradnl"/>
           </a:p>
@@ -1585,7 +1585,7 @@
           <a:p>
             <a:fld id="{6C5AE33D-32CE-4125-A2FD-63556E695E13}" type="datetimeFigureOut">
               <a:rPr lang="es-CO" smtClean="0"/>
-              <a:t>6/11/20</a:t>
+              <a:t>6/11/2020</a:t>
             </a:fld>
             <a:endParaRPr lang="es-CO"/>
           </a:p>
@@ -8125,8 +8125,8 @@
           </a:p>
         </p:txBody>
       </p:sp>
-      <mc:AlternateContent xmlns:mc="http://schemas.openxmlformats.org/markup-compatibility/2006">
-        <mc:Choice xmlns:a14="http://schemas.microsoft.com/office/drawing/2010/main" Requires="a14">
+      <mc:AlternateContent xmlns:mc="http://schemas.openxmlformats.org/markup-compatibility/2006" xmlns:a14="http://schemas.microsoft.com/office/drawing/2010/main">
+        <mc:Choice Requires="a14">
           <p:sp>
             <p:nvSpPr>
               <p:cNvPr id="3" name="2 Marcador de contenido"/>
@@ -8346,7 +8346,7 @@
             </p:txBody>
           </p:sp>
         </mc:Choice>
-        <mc:Fallback>
+        <mc:Fallback xmlns="">
           <p:sp>
             <p:nvSpPr>
               <p:cNvPr id="3" name="2 Marcador de contenido"/>
@@ -8446,8 +8446,8 @@
           </a:p>
         </p:txBody>
       </p:sp>
-      <mc:AlternateContent xmlns:mc="http://schemas.openxmlformats.org/markup-compatibility/2006">
-        <mc:Choice xmlns:a14="http://schemas.microsoft.com/office/drawing/2010/main" Requires="a14">
+      <mc:AlternateContent xmlns:mc="http://schemas.openxmlformats.org/markup-compatibility/2006" xmlns:a14="http://schemas.microsoft.com/office/drawing/2010/main">
+        <mc:Choice Requires="a14">
           <p:sp>
             <p:nvSpPr>
               <p:cNvPr id="3" name="2 Marcador de contenido"/>
@@ -8872,7 +8872,7 @@
             </p:txBody>
           </p:sp>
         </mc:Choice>
-        <mc:Fallback>
+        <mc:Fallback xmlns="">
           <p:sp>
             <p:nvSpPr>
               <p:cNvPr id="3" name="2 Marcador de contenido"/>
@@ -10917,7 +10917,7 @@
             </p:spPr>
             <p:txBody>
               <a:bodyPr>
-                <a:normAutofit/>
+                <a:normAutofit lnSpcReduction="10000"/>
               </a:bodyPr>
               <a:lstStyle/>
               <a:p>
@@ -12194,7 +12194,7 @@
               <a:blipFill>
                 <a:blip r:embed="rId2"/>
                 <a:stretch>
-                  <a:fillRect l="-485" t="-1128"/>
+                  <a:fillRect l="-524" t="-1993"/>
                 </a:stretch>
               </a:blipFill>
             </p:spPr>
@@ -16248,8 +16248,8 @@
           <a:chExt cx="0" cy="0"/>
         </a:xfrm>
       </p:grpSpPr>
-      <mc:AlternateContent xmlns:mc="http://schemas.openxmlformats.org/markup-compatibility/2006" xmlns:a14="http://schemas.microsoft.com/office/drawing/2010/main">
-        <mc:Choice Requires="a14">
+      <mc:AlternateContent xmlns:mc="http://schemas.openxmlformats.org/markup-compatibility/2006">
+        <mc:Choice xmlns:a14="http://schemas.microsoft.com/office/drawing/2010/main" Requires="a14">
           <p:sp>
             <p:nvSpPr>
               <p:cNvPr id="2" name="Marcador de contenido 1">
@@ -17817,93 +17817,6 @@
                           </m:r>
                         </m:sub>
                       </m:sSub>
-                      <m:r>
-                        <a:rPr lang="en-GB" sz="1800" i="1">
-                          <a:solidFill>
-                            <a:srgbClr val="FF0000"/>
-                          </a:solidFill>
-                          <a:effectLst/>
-                          <a:latin typeface="Cambria Math" panose="02040503050406030204" pitchFamily="18" charset="0"/>
-                          <a:ea typeface="Times New Roman" panose="02020603050405020304" pitchFamily="18" charset="0"/>
-                          <a:cs typeface="Times New Roman" panose="02020603050405020304" pitchFamily="18" charset="0"/>
-                        </a:rPr>
-                        <m:t> + </m:t>
-                      </m:r>
-                      <m:sSubSup>
-                        <m:sSubSupPr>
-                          <m:ctrlPr>
-                            <a:rPr lang="es-CO" sz="1800" i="1">
-                              <a:solidFill>
-                                <a:srgbClr val="FF0000"/>
-                              </a:solidFill>
-                              <a:effectLst/>
-                              <a:latin typeface="Cambria Math" panose="02040503050406030204" pitchFamily="18" charset="0"/>
-                              <a:ea typeface="Times New Roman" panose="02020603050405020304" pitchFamily="18" charset="0"/>
-                              <a:cs typeface="Times New Roman" panose="02020603050405020304" pitchFamily="18" charset="0"/>
-                            </a:rPr>
-                          </m:ctrlPr>
-                        </m:sSubSupPr>
-                        <m:e>
-                          <m:acc>
-                            <m:accPr>
-                              <m:chr m:val="̇"/>
-                              <m:ctrlPr>
-                                <a:rPr lang="es-CO" sz="1800" i="1">
-                                  <a:solidFill>
-                                    <a:srgbClr val="FF0000"/>
-                                  </a:solidFill>
-                                  <a:effectLst/>
-                                  <a:latin typeface="Cambria Math" panose="02040503050406030204" pitchFamily="18" charset="0"/>
-                                  <a:ea typeface="Times New Roman" panose="02020603050405020304" pitchFamily="18" charset="0"/>
-                                  <a:cs typeface="Times New Roman" panose="02020603050405020304" pitchFamily="18" charset="0"/>
-                                </a:rPr>
-                              </m:ctrlPr>
-                            </m:accPr>
-                            <m:e>
-                              <m:r>
-                                <a:rPr lang="es-CO" sz="1800" i="1">
-                                  <a:solidFill>
-                                    <a:srgbClr val="FF0000"/>
-                                  </a:solidFill>
-                                  <a:effectLst/>
-                                  <a:latin typeface="Cambria Math" panose="02040503050406030204" pitchFamily="18" charset="0"/>
-                                  <a:ea typeface="Times New Roman" panose="02020603050405020304" pitchFamily="18" charset="0"/>
-                                  <a:cs typeface="Times New Roman" panose="02020603050405020304" pitchFamily="18" charset="0"/>
-                                </a:rPr>
-                                <m:t>𝐿</m:t>
-                              </m:r>
-                            </m:e>
-                          </m:acc>
-                        </m:e>
-                        <m:sub>
-                          <m:r>
-                            <a:rPr lang="es-CO" sz="1800" i="1">
-                              <a:solidFill>
-                                <a:srgbClr val="FF0000"/>
-                              </a:solidFill>
-                              <a:effectLst/>
-                              <a:latin typeface="Cambria Math" panose="02040503050406030204" pitchFamily="18" charset="0"/>
-                              <a:ea typeface="Times New Roman" panose="02020603050405020304" pitchFamily="18" charset="0"/>
-                              <a:cs typeface="Times New Roman" panose="02020603050405020304" pitchFamily="18" charset="0"/>
-                            </a:rPr>
-                            <m:t>𝐻</m:t>
-                          </m:r>
-                        </m:sub>
-                        <m:sup>
-                          <m:r>
-                            <a:rPr lang="es-CO" sz="1800" i="1">
-                              <a:solidFill>
-                                <a:srgbClr val="FF0000"/>
-                              </a:solidFill>
-                              <a:effectLst/>
-                              <a:latin typeface="Cambria Math" panose="02040503050406030204" pitchFamily="18" charset="0"/>
-                              <a:ea typeface="Times New Roman" panose="02020603050405020304" pitchFamily="18" charset="0"/>
-                              <a:cs typeface="Times New Roman" panose="02020603050405020304" pitchFamily="18" charset="0"/>
-                            </a:rPr>
-                            <m:t>𝐷</m:t>
-                          </m:r>
-                        </m:sup>
-                      </m:sSubSup>
                     </m:oMath>
                   </m:oMathPara>
                 </a14:m>
@@ -18465,7 +18378,7 @@
             </p:txBody>
           </p:sp>
         </mc:Choice>
-        <mc:Fallback xmlns="">
+        <mc:Fallback>
           <p:sp>
             <p:nvSpPr>
               <p:cNvPr id="2" name="Marcador de contenido 1">

</xml_diff>